<commit_message>
Improved exercises for v3
</commit_message>
<xml_diff>
--- a/FSharpWorkshop_Slides.pptx
+++ b/FSharpWorkshop_Slides.pptx
@@ -17961,9 +17961,10 @@
           <a:p>
             <a:pPr algn="ctr"/>
             <a:r>
-              <a:rPr lang="en-AU" dirty="0"/>
-              <a:t>getSpendings</a:t>
-            </a:r>
+              <a:rPr lang="en-AU"/>
+              <a:t>getPurchases</a:t>
+            </a:r>
+            <a:endParaRPr lang="en-AU" dirty="0"/>
           </a:p>
         </p:txBody>
       </p:sp>
@@ -19851,9 +19852,10 @@
             <a:p>
               <a:pPr algn="ctr"/>
               <a:r>
-                <a:rPr lang="en-AU" dirty="0"/>
-                <a:t>getSpendings</a:t>
+                <a:rPr lang="en-AU" dirty="0" err="1"/>
+                <a:t>getPurchases</a:t>
               </a:r>
+              <a:endParaRPr lang="en-AU" dirty="0"/>
             </a:p>
           </p:txBody>
         </p:sp>
@@ -25256,9 +25258,10 @@
             <a:p>
               <a:pPr algn="ctr"/>
               <a:r>
-                <a:rPr lang="en-AU" dirty="0"/>
-                <a:t>getSpendings</a:t>
+                <a:rPr lang="en-AU" dirty="0" err="1"/>
+                <a:t>getPurchases</a:t>
               </a:r>
+              <a:endParaRPr lang="en-AU" dirty="0"/>
             </a:p>
           </p:txBody>
         </p:sp>
@@ -36202,9 +36205,10 @@
             <a:p>
               <a:pPr algn="ctr"/>
               <a:r>
-                <a:rPr lang="en-AU" dirty="0"/>
-                <a:t>getSpendings</a:t>
+                <a:rPr lang="en-AU" dirty="0" err="1"/>
+                <a:t>getPurchases</a:t>
               </a:r>
+              <a:endParaRPr lang="en-AU" dirty="0"/>
             </a:p>
           </p:txBody>
         </p:sp>
@@ -46173,9 +46177,10 @@
             <a:p>
               <a:pPr algn="ctr"/>
               <a:r>
-                <a:rPr lang="en-AU" dirty="0"/>
-                <a:t>getSpendings</a:t>
+                <a:rPr lang="en-AU" dirty="0" err="1"/>
+                <a:t>getPurchases</a:t>
               </a:r>
+              <a:endParaRPr lang="en-AU" dirty="0"/>
             </a:p>
           </p:txBody>
         </p:sp>
@@ -47842,7 +47847,7 @@
         </p:nvSpPr>
         <p:spPr>
           <a:xfrm>
-            <a:off x="2439003" y="2507264"/>
+            <a:off x="2526608" y="2507264"/>
             <a:ext cx="5162824" cy="769441"/>
           </a:xfrm>
           <a:prstGeom prst="rect">
@@ -47887,7 +47892,7 @@
         </p:nvSpPr>
         <p:spPr>
           <a:xfrm>
-            <a:off x="2435166" y="5622740"/>
+            <a:off x="2572053" y="5622740"/>
             <a:ext cx="5441361" cy="461665"/>
           </a:xfrm>
           <a:prstGeom prst="rect">
@@ -48021,7 +48026,7 @@
         </p:nvSpPr>
         <p:spPr>
           <a:xfrm>
-            <a:off x="2439003" y="3583528"/>
+            <a:off x="2515653" y="3583528"/>
             <a:ext cx="2220480" cy="461665"/>
           </a:xfrm>
           <a:prstGeom prst="rect">
@@ -48093,7 +48098,7 @@
         </p:nvSpPr>
         <p:spPr>
           <a:xfrm>
-            <a:off x="2435166" y="1618675"/>
+            <a:off x="2533721" y="1618675"/>
             <a:ext cx="3520516" cy="461665"/>
           </a:xfrm>
           <a:prstGeom prst="rect">
@@ -48329,7 +48334,7 @@
         </p:nvSpPr>
         <p:spPr>
           <a:xfrm>
-            <a:off x="2523639" y="4957349"/>
+            <a:off x="2512689" y="4957349"/>
             <a:ext cx="6848350" cy="461665"/>
           </a:xfrm>
           <a:prstGeom prst="rect">

</xml_diff>

<commit_message>
Completed version of Module1 for v3
</commit_message>
<xml_diff>
--- a/FSharpWorkshop_Slides.pptx
+++ b/FSharpWorkshop_Slides.pptx
@@ -2959,7 +2959,7 @@
           <a:p>
             <a:fld id="{20EA5F0D-C1DC-412F-A146-DDB3A74B588F}" type="datetimeFigureOut">
               <a:rPr lang="en-US"/>
-              <a:t>10/9/2016</a:t>
+              <a:t>10/13/2016</a:t>
             </a:fld>
             <a:endParaRPr/>
           </a:p>
@@ -3124,7 +3124,7 @@
           <a:p>
             <a:fld id="{A8CDE508-72C8-4AB5-AA9C-1584D31690E0}" type="datetimeFigureOut">
               <a:rPr lang="en-US"/>
-              <a:t>10/9/2016</a:t>
+              <a:t>10/13/2016</a:t>
             </a:fld>
             <a:endParaRPr/>
           </a:p>
@@ -3617,7 +3617,7 @@
           <a:p>
             <a:fld id="{4BDF68E2-58F2-4D09-BE8B-E3BD06533059}" type="datetimeFigureOut">
               <a:rPr lang="en-US" smtClean="0"/>
-              <a:t>10/9/2016</a:t>
+              <a:t>10/13/2016</a:t>
             </a:fld>
             <a:endParaRPr lang="en-US" dirty="0"/>
           </a:p>
@@ -3837,7 +3837,7 @@
           <a:p>
             <a:fld id="{9E583DDF-CA54-461A-A486-592D2374C532}" type="datetimeFigureOut">
               <a:rPr lang="en-US" smtClean="0"/>
-              <a:t>10/9/2016</a:t>
+              <a:t>10/13/2016</a:t>
             </a:fld>
             <a:endParaRPr lang="en-US"/>
           </a:p>
@@ -4105,7 +4105,7 @@
           <a:p>
             <a:fld id="{9E583DDF-CA54-461A-A486-592D2374C532}" type="datetimeFigureOut">
               <a:rPr lang="en-US" smtClean="0"/>
-              <a:t>10/9/2016</a:t>
+              <a:t>10/13/2016</a:t>
             </a:fld>
             <a:endParaRPr lang="en-US"/>
           </a:p>
@@ -4287,7 +4287,7 @@
           <a:p>
             <a:fld id="{9E583DDF-CA54-461A-A486-592D2374C532}" type="datetimeFigureOut">
               <a:rPr lang="en-US" smtClean="0"/>
-              <a:t>10/9/2016</a:t>
+              <a:t>10/13/2016</a:t>
             </a:fld>
             <a:endParaRPr lang="en-US"/>
           </a:p>
@@ -4642,7 +4642,7 @@
           <a:p>
             <a:fld id="{9E583DDF-CA54-461A-A486-592D2374C532}" type="datetimeFigureOut">
               <a:rPr lang="en-US" smtClean="0"/>
-              <a:t>10/9/2016</a:t>
+              <a:t>10/13/2016</a:t>
             </a:fld>
             <a:endParaRPr lang="en-US"/>
           </a:p>
@@ -4929,7 +4929,7 @@
           <a:p>
             <a:fld id="{0A879FD0-C37A-4F50-8F3B-5FA0D9D0B42F}" type="datetimeFigureOut">
               <a:rPr lang="en-US" smtClean="0"/>
-              <a:t>10/9/2016</a:t>
+              <a:t>10/13/2016</a:t>
             </a:fld>
             <a:endParaRPr lang="en-US"/>
           </a:p>
@@ -5320,7 +5320,7 @@
           <a:p>
             <a:fld id="{9E583DDF-CA54-461A-A486-592D2374C532}" type="datetimeFigureOut">
               <a:rPr lang="en-US" smtClean="0"/>
-              <a:t>10/9/2016</a:t>
+              <a:t>10/13/2016</a:t>
             </a:fld>
             <a:endParaRPr lang="en-US"/>
           </a:p>
@@ -5450,7 +5450,7 @@
           <a:p>
             <a:fld id="{9E583DDF-CA54-461A-A486-592D2374C532}" type="datetimeFigureOut">
               <a:rPr lang="en-US" smtClean="0"/>
-              <a:t>10/9/2016</a:t>
+              <a:t>10/13/2016</a:t>
             </a:fld>
             <a:endParaRPr lang="en-US"/>
           </a:p>
@@ -5633,7 +5633,7 @@
           <a:p>
             <a:fld id="{9E583DDF-CA54-461A-A486-592D2374C532}" type="datetimeFigureOut">
               <a:rPr lang="en-US" smtClean="0"/>
-              <a:t>10/9/2016</a:t>
+              <a:t>10/13/2016</a:t>
             </a:fld>
             <a:endParaRPr lang="en-US"/>
           </a:p>
@@ -5999,7 +5999,7 @@
           <a:p>
             <a:fld id="{9E583DDF-CA54-461A-A486-592D2374C532}" type="datetimeFigureOut">
               <a:rPr lang="en-US" smtClean="0"/>
-              <a:t>10/9/2016</a:t>
+              <a:t>10/13/2016</a:t>
             </a:fld>
             <a:endParaRPr lang="en-US"/>
           </a:p>
@@ -6388,7 +6388,7 @@
           <a:p>
             <a:fld id="{9E583DDF-CA54-461A-A486-592D2374C532}" type="datetimeFigureOut">
               <a:rPr lang="en-US" smtClean="0"/>
-              <a:t>10/9/2016</a:t>
+              <a:t>10/13/2016</a:t>
             </a:fld>
             <a:endParaRPr lang="en-US"/>
           </a:p>
@@ -6688,7 +6688,7 @@
             <a:fld id="{9E583DDF-CA54-461A-A486-592D2374C532}" type="datetimeFigureOut">
               <a:rPr lang="en-US" smtClean="0"/>
               <a:pPr/>
-              <a:t>10/9/2016</a:t>
+              <a:t>10/13/2016</a:t>
             </a:fld>
             <a:endParaRPr lang="en-US"/>
           </a:p>
@@ -17961,7 +17961,7 @@
           <a:p>
             <a:pPr algn="ctr"/>
             <a:r>
-              <a:rPr lang="en-AU"/>
+              <a:rPr lang="en-AU" dirty="0" err="1"/>
               <a:t>getPurchases</a:t>
             </a:r>
             <a:endParaRPr lang="en-AU" dirty="0"/>
@@ -19266,109 +19266,53 @@
             <a:chExt cx="9382483" cy="4000083"/>
           </a:xfrm>
         </p:grpSpPr>
-        <p:grpSp>
-          <p:nvGrpSpPr>
-            <p:cNvPr id="26" name="Group 25"/>
-            <p:cNvGrpSpPr/>
+        <p:sp>
+          <p:nvSpPr>
+            <p:cNvPr id="22" name="Rectangle 21"/>
+            <p:cNvSpPr/>
             <p:nvPr/>
-          </p:nvGrpSpPr>
-          <p:grpSpPr>
+          </p:nvSpPr>
+          <p:spPr>
             <a:xfrm>
               <a:off x="379353" y="1894091"/>
               <a:ext cx="9382483" cy="4000083"/>
-              <a:chOff x="366996" y="1894091"/>
-              <a:chExt cx="9382483" cy="4000083"/>
             </a:xfrm>
-          </p:grpSpPr>
-          <p:sp>
-            <p:nvSpPr>
-              <p:cNvPr id="22" name="Rectangle 21"/>
-              <p:cNvSpPr/>
-              <p:nvPr/>
-            </p:nvSpPr>
-            <p:spPr>
-              <a:xfrm>
-                <a:off x="366996" y="1894091"/>
-                <a:ext cx="9382483" cy="4000083"/>
-              </a:xfrm>
-              <a:prstGeom prst="rect">
-                <a:avLst/>
-              </a:prstGeom>
-              <a:noFill/>
-              <a:ln w="25400">
-                <a:solidFill>
-                  <a:schemeClr val="accent2"/>
-                </a:solidFill>
-              </a:ln>
-            </p:spPr>
-            <p:style>
-              <a:lnRef idx="2">
-                <a:schemeClr val="accent4"/>
-              </a:lnRef>
-              <a:fillRef idx="1">
-                <a:schemeClr val="lt1"/>
-              </a:fillRef>
-              <a:effectRef idx="0">
-                <a:schemeClr val="accent4"/>
-              </a:effectRef>
-              <a:fontRef idx="minor">
-                <a:schemeClr val="dk1"/>
-              </a:fontRef>
-            </p:style>
-            <p:txBody>
-              <a:bodyPr rtlCol="0" anchor="b" anchorCtr="0"/>
-              <a:lstStyle/>
-              <a:p>
-                <a:pPr algn="r"/>
-                <a:r>
-                  <a:rPr lang="en-AU" dirty="0"/>
-                  <a:t>Module 4</a:t>
-                </a:r>
-              </a:p>
-            </p:txBody>
-          </p:sp>
-          <p:sp>
-            <p:nvSpPr>
-              <p:cNvPr id="24" name="Rounded Rectangle 23"/>
-              <p:cNvSpPr/>
-              <p:nvPr/>
-            </p:nvSpPr>
-            <p:spPr>
-              <a:xfrm>
-                <a:off x="7479862" y="2000769"/>
-                <a:ext cx="2211760" cy="654908"/>
-              </a:xfrm>
-              <a:prstGeom prst="roundRect">
-                <a:avLst/>
-              </a:prstGeom>
-            </p:spPr>
-            <p:style>
-              <a:lnRef idx="3">
-                <a:schemeClr val="lt1"/>
-              </a:lnRef>
-              <a:fillRef idx="1">
-                <a:schemeClr val="accent1"/>
-              </a:fillRef>
-              <a:effectRef idx="1">
-                <a:schemeClr val="accent1"/>
-              </a:effectRef>
-              <a:fontRef idx="minor">
-                <a:schemeClr val="lt1"/>
-              </a:fontRef>
-            </p:style>
-            <p:txBody>
-              <a:bodyPr lIns="0" rIns="0" rtlCol="0" anchor="ctr"/>
-              <a:lstStyle/>
-              <a:p>
-                <a:pPr algn="ctr"/>
-                <a:r>
-                  <a:rPr lang="en-AU" dirty="0"/>
-                  <a:t>getSpendingsByMonth</a:t>
-                </a:r>
-              </a:p>
-            </p:txBody>
-          </p:sp>
-        </p:grpSp>
+            <a:prstGeom prst="rect">
+              <a:avLst/>
+            </a:prstGeom>
+            <a:noFill/>
+            <a:ln w="25400">
+              <a:solidFill>
+                <a:schemeClr val="accent2"/>
+              </a:solidFill>
+            </a:ln>
+          </p:spPr>
+          <p:style>
+            <a:lnRef idx="2">
+              <a:schemeClr val="accent4"/>
+            </a:lnRef>
+            <a:fillRef idx="1">
+              <a:schemeClr val="lt1"/>
+            </a:fillRef>
+            <a:effectRef idx="0">
+              <a:schemeClr val="accent4"/>
+            </a:effectRef>
+            <a:fontRef idx="minor">
+              <a:schemeClr val="dk1"/>
+            </a:fontRef>
+          </p:style>
+          <p:txBody>
+            <a:bodyPr rtlCol="0" anchor="b" anchorCtr="0"/>
+            <a:lstStyle/>
+            <a:p>
+              <a:pPr algn="r"/>
+              <a:r>
+                <a:rPr lang="en-AU" dirty="0"/>
+                <a:t>Module 4</a:t>
+              </a:r>
+            </a:p>
+          </p:txBody>
+        </p:sp>
         <p:sp>
           <p:nvSpPr>
             <p:cNvPr id="28" name="Rounded Rectangle 27"/>
@@ -19377,7 +19321,7 @@
           </p:nvSpPr>
           <p:spPr>
             <a:xfrm>
-              <a:off x="7500963" y="2762355"/>
+              <a:off x="7492675" y="2000769"/>
               <a:ext cx="2205493" cy="654908"/>
             </a:xfrm>
             <a:prstGeom prst="roundRect">
@@ -19404,9 +19348,10 @@
             <a:p>
               <a:pPr algn="ctr"/>
               <a:r>
-                <a:rPr lang="en-AU" dirty="0"/>
-                <a:t>Csv Provider</a:t>
+                <a:rPr lang="en-AU" dirty="0" err="1"/>
+                <a:t>CustomerService</a:t>
               </a:r>
+              <a:endParaRPr lang="en-AU" dirty="0"/>
             </a:p>
           </p:txBody>
         </p:sp>
@@ -19418,7 +19363,7 @@
           </p:nvSpPr>
           <p:spPr>
             <a:xfrm>
-              <a:off x="7492675" y="3498813"/>
+              <a:off x="7500963" y="2763877"/>
               <a:ext cx="2213781" cy="654908"/>
             </a:xfrm>
             <a:prstGeom prst="roundRect">
@@ -35407,13 +35352,13 @@
   <p:clrMapOvr>
     <a:masterClrMapping/>
   </p:clrMapOvr>
-  <mc:AlternateContent xmlns:mc="http://schemas.openxmlformats.org/markup-compatibility/2006">
-    <mc:Choice xmlns:p14="http://schemas.microsoft.com/office/powerpoint/2010/main" Requires="p14">
+  <mc:AlternateContent xmlns:mc="http://schemas.openxmlformats.org/markup-compatibility/2006" xmlns:p14="http://schemas.microsoft.com/office/powerpoint/2010/main">
+    <mc:Choice Requires="p14">
       <p:transition spd="med" p14:dur="700">
         <p:fade/>
       </p:transition>
     </mc:Choice>
-    <mc:Fallback>
+    <mc:Fallback xmlns="">
       <p:transition spd="med">
         <p:fade/>
       </p:transition>
@@ -46697,10 +46642,10 @@
                 <a:schemeClr val="lt1"/>
               </a:lnRef>
               <a:fillRef idx="1">
-                <a:schemeClr val="accent1"/>
+                <a:schemeClr val="accent2"/>
               </a:fillRef>
               <a:effectRef idx="1">
-                <a:schemeClr val="accent1"/>
+                <a:schemeClr val="accent2"/>
               </a:effectRef>
               <a:fontRef idx="minor">
                 <a:schemeClr val="lt1"/>
@@ -46712,54 +46657,14 @@
               <a:p>
                 <a:pPr algn="ctr"/>
                 <a:r>
-                  <a:rPr lang="en-AU" dirty="0"/>
-                  <a:t>getSpendingsByMonth</a:t>
+                  <a:rPr lang="en-AU" dirty="0" err="1"/>
+                  <a:t>CustomerService</a:t>
                 </a:r>
+                <a:endParaRPr lang="en-AU" dirty="0"/>
               </a:p>
             </p:txBody>
           </p:sp>
         </p:grpSp>
-        <p:sp>
-          <p:nvSpPr>
-            <p:cNvPr id="43" name="Rounded Rectangle 42"/>
-            <p:cNvSpPr/>
-            <p:nvPr/>
-          </p:nvSpPr>
-          <p:spPr>
-            <a:xfrm>
-              <a:off x="7494343" y="2762355"/>
-              <a:ext cx="2205493" cy="654908"/>
-            </a:xfrm>
-            <a:prstGeom prst="roundRect">
-              <a:avLst/>
-            </a:prstGeom>
-          </p:spPr>
-          <p:style>
-            <a:lnRef idx="3">
-              <a:schemeClr val="lt1"/>
-            </a:lnRef>
-            <a:fillRef idx="1">
-              <a:schemeClr val="accent2"/>
-            </a:fillRef>
-            <a:effectRef idx="1">
-              <a:schemeClr val="accent2"/>
-            </a:effectRef>
-            <a:fontRef idx="minor">
-              <a:schemeClr val="lt1"/>
-            </a:fontRef>
-          </p:style>
-          <p:txBody>
-            <a:bodyPr rtlCol="0" anchor="ctr"/>
-            <a:lstStyle/>
-            <a:p>
-              <a:pPr algn="ctr"/>
-              <a:r>
-                <a:rPr lang="en-AU" dirty="0"/>
-                <a:t>Csv Provider</a:t>
-              </a:r>
-            </a:p>
-          </p:txBody>
-        </p:sp>
         <p:sp>
           <p:nvSpPr>
             <p:cNvPr id="44" name="Rounded Rectangle 43"/>
@@ -46768,7 +46673,7 @@
           </p:nvSpPr>
           <p:spPr>
             <a:xfrm>
-              <a:off x="7490198" y="3521700"/>
+              <a:off x="7490198" y="2762355"/>
               <a:ext cx="2213781" cy="654908"/>
             </a:xfrm>
             <a:prstGeom prst="roundRect">
@@ -50009,6 +49914,21 @@
 </file>
 
 <file path=customXml/item1.xml><?xml version="1.0" encoding="utf-8"?>
+<?mso-contentType ?>
+<FormTemplates xmlns="http://schemas.microsoft.com/sharepoint/v3/contenttype/forms">
+  <Display>DocumentLibraryForm</Display>
+  <Edit>DocumentLibraryForm</Edit>
+  <New>DocumentLibraryForm</New>
+</FormTemplates>
+</file>
+
+<file path=customXml/item2.xml><?xml version="1.0" encoding="utf-8"?>
+<p:properties xmlns:p="http://schemas.microsoft.com/office/2006/metadata/properties" xmlns:xsi="http://www.w3.org/2001/XMLSchema-instance" xmlns:pc="http://schemas.microsoft.com/office/infopath/2007/PartnerControls">
+  <documentManagement/>
+</p:properties>
+</file>
+
+<file path=customXml/item3.xml><?xml version="1.0" encoding="utf-8"?>
 <ct:contentTypeSchema xmlns:ct="http://schemas.microsoft.com/office/2006/metadata/contentType" xmlns:ma="http://schemas.microsoft.com/office/2006/metadata/properties/metaAttributes" ct:_="" ma:_="" ma:contentTypeName="Document" ma:contentTypeID="0x0101007C1D5F340F01F94FA2FD29A5E6DC872E" ma:contentTypeVersion="0" ma:contentTypeDescription="Create a new document." ma:contentTypeScope="" ma:versionID="f583bd66513a361a730282b6a794e352">
   <xsd:schema xmlns:xsd="http://www.w3.org/2001/XMLSchema" xmlns:xs="http://www.w3.org/2001/XMLSchema" xmlns:p="http://schemas.microsoft.com/office/2006/metadata/properties" targetNamespace="http://schemas.microsoft.com/office/2006/metadata/properties" ma:root="true" ma:fieldsID="6841151cf538834e171094e4faaf2d73">
     <xsd:element name="properties">
@@ -50122,22 +50042,30 @@
 </ct:contentTypeSchema>
 </file>
 
-<file path=customXml/item2.xml><?xml version="1.0" encoding="utf-8"?>
-<?mso-contentType ?>
-<FormTemplates xmlns="http://schemas.microsoft.com/sharepoint/v3/contenttype/forms">
-  <Display>DocumentLibraryForm</Display>
-  <Edit>DocumentLibraryForm</Edit>
-  <New>DocumentLibraryForm</New>
-</FormTemplates>
+<file path=customXml/itemProps1.xml><?xml version="1.0" encoding="utf-8"?>
+<ds:datastoreItem xmlns:ds="http://schemas.openxmlformats.org/officeDocument/2006/customXml" ds:itemID="{13DE0ED7-AE8B-4CE1-892D-805FE0D473B5}">
+  <ds:schemaRefs>
+    <ds:schemaRef ds:uri="http://schemas.microsoft.com/sharepoint/v3/contenttype/forms"/>
+  </ds:schemaRefs>
+</ds:datastoreItem>
 </file>
 
-<file path=customXml/item3.xml><?xml version="1.0" encoding="utf-8"?>
-<p:properties xmlns:p="http://schemas.microsoft.com/office/2006/metadata/properties" xmlns:xsi="http://www.w3.org/2001/XMLSchema-instance" xmlns:pc="http://schemas.microsoft.com/office/infopath/2007/PartnerControls">
-  <documentManagement/>
-</p:properties>
+<file path=customXml/itemProps2.xml><?xml version="1.0" encoding="utf-8"?>
+<ds:datastoreItem xmlns:ds="http://schemas.openxmlformats.org/officeDocument/2006/customXml" ds:itemID="{9A69BF48-D9C3-4DE0-818A-0C2EC431B649}">
+  <ds:schemaRefs>
+    <ds:schemaRef ds:uri="http://purl.org/dc/terms/"/>
+    <ds:schemaRef ds:uri="http://purl.org/dc/dcmitype/"/>
+    <ds:schemaRef ds:uri="http://schemas.openxmlformats.org/package/2006/metadata/core-properties"/>
+    <ds:schemaRef ds:uri="http://schemas.microsoft.com/office/2006/documentManagement/types"/>
+    <ds:schemaRef ds:uri="http://purl.org/dc/elements/1.1/"/>
+    <ds:schemaRef ds:uri="http://schemas.microsoft.com/office/2006/metadata/properties"/>
+    <ds:schemaRef ds:uri="http://schemas.microsoft.com/office/infopath/2007/PartnerControls"/>
+    <ds:schemaRef ds:uri="http://www.w3.org/XML/1998/namespace"/>
+  </ds:schemaRefs>
+</ds:datastoreItem>
 </file>
 
-<file path=customXml/itemProps1.xml><?xml version="1.0" encoding="utf-8"?>
+<file path=customXml/itemProps3.xml><?xml version="1.0" encoding="utf-8"?>
 <ds:datastoreItem xmlns:ds="http://schemas.openxmlformats.org/officeDocument/2006/customXml" ds:itemID="{566C857B-E52C-4200-9223-45EEE86CA270}">
   <ds:schemaRefs>
     <ds:schemaRef ds:uri="http://schemas.microsoft.com/office/2006/metadata/contentType"/>
@@ -50151,27 +50079,4 @@
     <ds:schemaRef ds:uri="http://schemas.microsoft.com/office/infopath/2007/PartnerControls"/>
   </ds:schemaRefs>
 </ds:datastoreItem>
-</file>
-
-<file path=customXml/itemProps2.xml><?xml version="1.0" encoding="utf-8"?>
-<ds:datastoreItem xmlns:ds="http://schemas.openxmlformats.org/officeDocument/2006/customXml" ds:itemID="{13DE0ED7-AE8B-4CE1-892D-805FE0D473B5}">
-  <ds:schemaRefs>
-    <ds:schemaRef ds:uri="http://schemas.microsoft.com/sharepoint/v3/contenttype/forms"/>
-  </ds:schemaRefs>
-</ds:datastoreItem>
-</file>
-
-<file path=customXml/itemProps3.xml><?xml version="1.0" encoding="utf-8"?>
-<ds:datastoreItem xmlns:ds="http://schemas.openxmlformats.org/officeDocument/2006/customXml" ds:itemID="{9A69BF48-D9C3-4DE0-818A-0C2EC431B649}">
-  <ds:schemaRefs>
-    <ds:schemaRef ds:uri="http://purl.org/dc/terms/"/>
-    <ds:schemaRef ds:uri="http://purl.org/dc/dcmitype/"/>
-    <ds:schemaRef ds:uri="http://schemas.openxmlformats.org/package/2006/metadata/core-properties"/>
-    <ds:schemaRef ds:uri="http://schemas.microsoft.com/office/2006/documentManagement/types"/>
-    <ds:schemaRef ds:uri="http://purl.org/dc/elements/1.1/"/>
-    <ds:schemaRef ds:uri="http://schemas.microsoft.com/office/2006/metadata/properties"/>
-    <ds:schemaRef ds:uri="http://schemas.microsoft.com/office/infopath/2007/PartnerControls"/>
-    <ds:schemaRef ds:uri="http://www.w3.org/XML/1998/namespace"/>
-  </ds:schemaRefs>
-</ds:datastoreItem>
 </file>
</xml_diff>